<commit_message>
updates to notebook and ppt
</commit_message>
<xml_diff>
--- a/210 intro data eng/uwbigdata210.pptx
+++ b/210 intro data eng/uwbigdata210.pptx
@@ -8,8 +8,7 @@
     <p:sldId id="256" r:id="rId2"/>
     <p:sldId id="257" r:id="rId3"/>
     <p:sldId id="258" r:id="rId4"/>
-    <p:sldId id="259" r:id="rId5"/>
-    <p:sldId id="260" r:id="rId6"/>
+    <p:sldId id="260" r:id="rId5"/>
   </p:sldIdLst>
   <p:sldSz cx="12192000" cy="6858000"/>
   <p:notesSz cx="6858000" cy="9144000"/>
@@ -108,6 +107,11 @@
       </a:defRPr>
     </a:lvl9pPr>
   </p:defaultTextStyle>
+  <p:extLst>
+    <p:ext uri="{EFAFB233-063F-42B5-8137-9DF3F51BA10A}">
+      <p15:sldGuideLst xmlns:p15="http://schemas.microsoft.com/office/powerpoint/2012/main"/>
+    </p:ext>
+  </p:extLst>
 </p:presentation>
 </file>
 
@@ -7800,7 +7804,12 @@
             <p:ph type="subTitle" idx="1"/>
           </p:nvPr>
         </p:nvSpPr>
-        <p:spPr/>
+        <p:spPr>
+          <a:xfrm>
+            <a:off x="694836" y="1401458"/>
+            <a:ext cx="8144134" cy="1117687"/>
+          </a:xfrm>
+        </p:spPr>
         <p:txBody>
           <a:bodyPr>
             <a:normAutofit/>
@@ -8053,132 +8062,6 @@
           <p:cNvPr id="2" name="Title 1">
             <a:extLst>
               <a:ext uri="{FF2B5EF4-FFF2-40B4-BE49-F238E27FC236}">
-                <a16:creationId xmlns:a16="http://schemas.microsoft.com/office/drawing/2014/main" id="{B4FC0F42-171B-7843-BF6C-16E5A9005C97}"/>
-              </a:ext>
-            </a:extLst>
-          </p:cNvPr>
-          <p:cNvSpPr>
-            <a:spLocks noGrp="1"/>
-          </p:cNvSpPr>
-          <p:nvPr>
-            <p:ph type="title"/>
-          </p:nvPr>
-        </p:nvSpPr>
-        <p:spPr/>
-        <p:txBody>
-          <a:bodyPr/>
-          <a:lstStyle/>
-          <a:p>
-            <a:r>
-              <a:rPr lang="en-US" dirty="0"/>
-              <a:t>Considerations for using AWS</a:t>
-            </a:r>
-          </a:p>
-        </p:txBody>
-      </p:sp>
-      <p:sp>
-        <p:nvSpPr>
-          <p:cNvPr id="3" name="Content Placeholder 2">
-            <a:extLst>
-              <a:ext uri="{FF2B5EF4-FFF2-40B4-BE49-F238E27FC236}">
-                <a16:creationId xmlns:a16="http://schemas.microsoft.com/office/drawing/2014/main" id="{9ACBC0C9-2DB2-2B4C-8A4E-EA6A1F974EA1}"/>
-              </a:ext>
-            </a:extLst>
-          </p:cNvPr>
-          <p:cNvSpPr>
-            <a:spLocks noGrp="1"/>
-          </p:cNvSpPr>
-          <p:nvPr>
-            <p:ph idx="1"/>
-          </p:nvPr>
-        </p:nvSpPr>
-        <p:spPr/>
-        <p:txBody>
-          <a:bodyPr/>
-          <a:lstStyle/>
-          <a:p>
-            <a:r>
-              <a:rPr lang="en-US" dirty="0"/>
-              <a:t>EMR and networking</a:t>
-            </a:r>
-          </a:p>
-          <a:p>
-            <a:pPr lvl="1"/>
-            <a:r>
-              <a:rPr lang="en-US" dirty="0"/>
-              <a:t>VPC, Internet Gateway, Endpoints</a:t>
-            </a:r>
-          </a:p>
-          <a:p>
-            <a:r>
-              <a:rPr lang="en-US" dirty="0"/>
-              <a:t>Granular permission models</a:t>
-            </a:r>
-          </a:p>
-          <a:p>
-            <a:pPr lvl="1"/>
-            <a:r>
-              <a:rPr lang="en-US" dirty="0"/>
-              <a:t>SSH, IAM, S3</a:t>
-            </a:r>
-          </a:p>
-          <a:p>
-            <a:r>
-              <a:rPr lang="en-US" dirty="0"/>
-              <a:t>Notebook options</a:t>
-            </a:r>
-          </a:p>
-          <a:p>
-            <a:pPr lvl="1"/>
-            <a:r>
-              <a:rPr lang="en-US" dirty="0"/>
-              <a:t>Launch separate SageMaker notebook (public network)</a:t>
-            </a:r>
-          </a:p>
-          <a:p>
-            <a:pPr lvl="1"/>
-            <a:r>
-              <a:rPr lang="en-US" dirty="0"/>
-              <a:t>Launch built-in EMR Notebook (private network)</a:t>
-            </a:r>
-          </a:p>
-        </p:txBody>
-      </p:sp>
-    </p:spTree>
-    <p:extLst>
-      <p:ext uri="{BB962C8B-B14F-4D97-AF65-F5344CB8AC3E}">
-        <p14:creationId xmlns:p14="http://schemas.microsoft.com/office/powerpoint/2010/main" val="2984445076"/>
-      </p:ext>
-    </p:extLst>
-  </p:cSld>
-  <p:clrMapOvr>
-    <a:masterClrMapping/>
-  </p:clrMapOvr>
-</p:sld>
-</file>
-
-<file path=ppt/slides/slide5.xml><?xml version="1.0" encoding="utf-8"?>
-<p:sld xmlns:a="http://schemas.openxmlformats.org/drawingml/2006/main" xmlns:r="http://schemas.openxmlformats.org/officeDocument/2006/relationships" xmlns:p="http://schemas.openxmlformats.org/presentationml/2006/main">
-  <p:cSld>
-    <p:spTree>
-      <p:nvGrpSpPr>
-        <p:cNvPr id="1" name=""/>
-        <p:cNvGrpSpPr/>
-        <p:nvPr/>
-      </p:nvGrpSpPr>
-      <p:grpSpPr>
-        <a:xfrm>
-          <a:off x="0" y="0"/>
-          <a:ext cx="0" cy="0"/>
-          <a:chOff x="0" y="0"/>
-          <a:chExt cx="0" cy="0"/>
-        </a:xfrm>
-      </p:grpSpPr>
-      <p:sp>
-        <p:nvSpPr>
-          <p:cNvPr id="2" name="Title 1">
-            <a:extLst>
-              <a:ext uri="{FF2B5EF4-FFF2-40B4-BE49-F238E27FC236}">
                 <a16:creationId xmlns:a16="http://schemas.microsoft.com/office/drawing/2014/main" id="{15B6D4C6-512E-DF4F-AC2E-7FF33DD253BD}"/>
               </a:ext>
             </a:extLst>
@@ -8221,20 +8104,33 @@
         <p:spPr/>
         <p:txBody>
           <a:bodyPr>
-            <a:normAutofit lnSpcReduction="10000"/>
+            <a:normAutofit fontScale="92500" lnSpcReduction="20000"/>
           </a:bodyPr>
           <a:lstStyle/>
           <a:p>
             <a:r>
               <a:rPr lang="en-US" dirty="0"/>
-              <a:t>EMR in private VPC with built-in notebook</a:t>
+              <a:t>Notebook options</a:t>
             </a:r>
           </a:p>
           <a:p>
             <a:pPr lvl="1"/>
             <a:r>
               <a:rPr lang="en-US" dirty="0"/>
-              <a:t>5 x m5.large instances (1 master + 4 workers)</a:t>
+              <a:t>Launch separate SageMaker notebook (public network)</a:t>
+            </a:r>
+          </a:p>
+          <a:p>
+            <a:pPr lvl="1"/>
+            <a:r>
+              <a:rPr lang="en-US" dirty="0"/>
+              <a:t>Launch built-in EMR Notebook (private network)</a:t>
+            </a:r>
+          </a:p>
+          <a:p>
+            <a:r>
+              <a:rPr lang="en-US" dirty="0"/>
+              <a:t>EMR in private networking with built-in notebook</a:t>
             </a:r>
           </a:p>
           <a:p>

</xml_diff>